<commit_message>
orders first before comments
</commit_message>
<xml_diff>
--- a/reports/Daily Scrum/Bao_Cao_Tien_Do_Cong_Viec_19-05-2021.pptx
+++ b/reports/Daily Scrum/Bao_Cao_Tien_Do_Cong_Viec_19-05-2021.pptx
@@ -250,7 +250,7 @@
       <p15:sldGuideLst xmlns:p15="http://schemas.microsoft.com/office/powerpoint/2012/main"/>
     </p:ext>
     <p:ext uri="http://customooxmlschemas.google.com/">
-      <go:slidesCustomData xmlns:go="http://customooxmlschemas.google.com/" xmlns:ahyp="http://schemas.microsoft.com/office/drawing/2018/hyperlinkcolor" xmlns:p15="http://schemas.microsoft.com/office/powerpoint/2012/main" xmlns:p14="http://schemas.microsoft.com/office/powerpoint/2010/main" xmlns:com="http://schemas.openxmlformats.org/drawingml/2006/compatibility" xmlns:pvml="urn:schemas-microsoft-com:office:powerpoint" xmlns:v="urn:schemas-microsoft-com:vml" xmlns:o="urn:schemas-microsoft-com:office:office" xmlns:dgm="http://schemas.openxmlformats.org/drawingml/2006/diagram" xmlns:c="http://schemas.openxmlformats.org/drawingml/2006/chart" xmlns:mv="urn:schemas-microsoft-com:mac:vml" xmlns:mc="http://schemas.openxmlformats.org/markup-compatibility/2006" xmlns="" r:id="rId10" roundtripDataSignature="AMtx7mghNSnxQ9l0C20/qzc99mpsPxlxnQ=="/>
+      <go:slidesCustomData xmlns="" xmlns:mc="http://schemas.openxmlformats.org/markup-compatibility/2006" xmlns:mv="urn:schemas-microsoft-com:mac:vml" xmlns:c="http://schemas.openxmlformats.org/drawingml/2006/chart" xmlns:dgm="http://schemas.openxmlformats.org/drawingml/2006/diagram" xmlns:o="urn:schemas-microsoft-com:office:office" xmlns:v="urn:schemas-microsoft-com:vml" xmlns:pvml="urn:schemas-microsoft-com:office:powerpoint" xmlns:com="http://schemas.openxmlformats.org/drawingml/2006/compatibility" xmlns:p14="http://schemas.microsoft.com/office/powerpoint/2010/main" xmlns:p15="http://schemas.microsoft.com/office/powerpoint/2012/main" xmlns:ahyp="http://schemas.microsoft.com/office/drawing/2018/hyperlinkcolor" xmlns:go="http://customooxmlschemas.google.com/" r:id="rId10" roundtripDataSignature="AMtx7mghNSnxQ9l0C20/qzc99mpsPxlxnQ=="/>
     </p:ext>
   </p:extLst>
 </p:presentation>
@@ -27317,7 +27317,7 @@
           <p:nvPr>
             <p:extLst>
               <p:ext uri="{D42A27DB-BD31-4B8C-83A1-F6EECF244321}">
-                <p14:modId xmlns:p14="http://schemas.microsoft.com/office/powerpoint/2010/main" val="2872556389"/>
+                <p14:modId xmlns:p14="http://schemas.microsoft.com/office/powerpoint/2010/main" val="180781296"/>
               </p:ext>
             </p:extLst>
           </p:nvPr>
@@ -27626,7 +27626,43 @@
                         <a:rPr lang="vi-VN" sz="1600">
                           <a:latin typeface="+mn-lt"/>
                         </a:rPr>
-                        <a:t>Thêm vào giỏ hang</a:t>
+                        <a:t>Thêm vào giỏ </a:t>
+                      </a:r>
+                      <a:r>
+                        <a:rPr lang="vi-VN" sz="1600" b="0" i="0" u="none" strike="noStrike" cap="none">
+                          <a:solidFill>
+                            <a:srgbClr val="000000"/>
+                          </a:solidFill>
+                          <a:latin typeface="Arial"/>
+                          <a:ea typeface="Arial"/>
+                          <a:cs typeface="Arial"/>
+                          <a:sym typeface="Arial"/>
+                        </a:rPr>
+                        <a:t>h</a:t>
+                      </a:r>
+                      <a:r>
+                        <a:rPr lang="en-US" sz="1600" b="0" i="0" u="none" strike="noStrike" cap="none">
+                          <a:solidFill>
+                            <a:srgbClr val="000000"/>
+                          </a:solidFill>
+                          <a:latin typeface="Arial"/>
+                          <a:ea typeface="Arial"/>
+                          <a:cs typeface="Arial"/>
+                          <a:sym typeface="Arial"/>
+                        </a:rPr>
+                        <a:t>à</a:t>
+                      </a:r>
+                      <a:r>
+                        <a:rPr lang="vi-VN" sz="1600" b="0" i="0" u="none" strike="noStrike" cap="none">
+                          <a:solidFill>
+                            <a:srgbClr val="000000"/>
+                          </a:solidFill>
+                          <a:latin typeface="Arial"/>
+                          <a:ea typeface="Arial"/>
+                          <a:cs typeface="Arial"/>
+                          <a:sym typeface="Arial"/>
+                        </a:rPr>
+                        <a:t>ng</a:t>
                       </a:r>
                       <a:r>
                         <a:rPr lang="en-US" sz="1600">
@@ -27668,7 +27704,43 @@
                         <a:rPr lang="vi-VN" sz="1600">
                           <a:latin typeface="+mn-lt"/>
                         </a:rPr>
-                        <a:t>Xem lại giỏ hang</a:t>
+                        <a:t>Xem lại giỏ </a:t>
+                      </a:r>
+                      <a:r>
+                        <a:rPr lang="vi-VN" sz="1600" b="0" i="0" u="none" strike="noStrike" cap="none">
+                          <a:solidFill>
+                            <a:srgbClr val="000000"/>
+                          </a:solidFill>
+                          <a:latin typeface="Arial"/>
+                          <a:ea typeface="Arial"/>
+                          <a:cs typeface="Arial"/>
+                          <a:sym typeface="Arial"/>
+                        </a:rPr>
+                        <a:t>h</a:t>
+                      </a:r>
+                      <a:r>
+                        <a:rPr lang="en-US" sz="1600" b="0" i="0" u="none" strike="noStrike" cap="none">
+                          <a:solidFill>
+                            <a:srgbClr val="000000"/>
+                          </a:solidFill>
+                          <a:latin typeface="Arial"/>
+                          <a:ea typeface="Arial"/>
+                          <a:cs typeface="Arial"/>
+                          <a:sym typeface="Arial"/>
+                        </a:rPr>
+                        <a:t>à</a:t>
+                      </a:r>
+                      <a:r>
+                        <a:rPr lang="vi-VN" sz="1600" b="0" i="0" u="none" strike="noStrike" cap="none">
+                          <a:solidFill>
+                            <a:srgbClr val="000000"/>
+                          </a:solidFill>
+                          <a:latin typeface="Arial"/>
+                          <a:ea typeface="Arial"/>
+                          <a:cs typeface="Arial"/>
+                          <a:sym typeface="Arial"/>
+                        </a:rPr>
+                        <a:t>ng</a:t>
                       </a:r>
                       <a:r>
                         <a:rPr lang="en-US" sz="1600">
@@ -28028,7 +28100,7 @@
           <p:nvPr>
             <p:extLst>
               <p:ext uri="{D42A27DB-BD31-4B8C-83A1-F6EECF244321}">
-                <p14:modId xmlns:p14="http://schemas.microsoft.com/office/powerpoint/2010/main" val="1568238968"/>
+                <p14:modId xmlns:p14="http://schemas.microsoft.com/office/powerpoint/2010/main" val="916708724"/>
               </p:ext>
             </p:extLst>
           </p:nvPr>
@@ -28286,7 +28358,7 @@
                           <a:cs typeface="Arial"/>
                           <a:sym typeface="Arial"/>
                         </a:rPr>
-                        <a:t> ✔️</a:t>
+                        <a:t> </a:t>
                       </a:r>
                       <a:endParaRPr lang="en-US" sz="1600">
                         <a:latin typeface="+mn-lt"/>
@@ -28382,7 +28454,7 @@
                         <a:rPr lang="en-US" sz="1600">
                           <a:latin typeface="+mn-lt"/>
                         </a:rPr>
-                        <a:t>100%</a:t>
+                        <a:t>90%</a:t>
                       </a:r>
                       <a:endParaRPr sz="1600">
                         <a:latin typeface="+mn-lt"/>

</xml_diff>